<commit_message>
Revise technical report for clarity and depth
- Expanded the technical report to provide a comprehensive overview of the TaskForce agent framework, detailing its architecture, components, and execution flow.
- Enhanced the introduction and motivation sections to clarify the project's goals and personal motivations behind building the framework.
- Introduced a structured problem statement outlining the limitations of existing agent frameworks and how TaskForce addresses these issues.
- Added detailed descriptions of core components, including the Agent Orchestrator, TodoList Manager, and Tool System, emphasizing their roles and functionalities.
- Included sections on strengths, limitations, learning outcomes, and future development paths to provide a holistic view of the framework's current state and potential evolution.
</commit_message>
<xml_diff>
--- a/capstone/documents/TaskForce.pptx
+++ b/capstone/documents/TaskForce.pptx
@@ -110,6 +110,11 @@
       </a:defRPr>
     </a:lvl9pPr>
   </p:defaultTextStyle>
+  <p:extLst>
+    <p:ext uri="{EFAFB233-063F-42B5-8137-9DF3F51BA10A}">
+      <p15:sldGuideLst xmlns:p15="http://schemas.microsoft.com/office/powerpoint/2012/main"/>
+    </p:ext>
+  </p:extLst>
 </p:presentation>
 </file>
 
@@ -3596,7 +3601,7 @@
         </p:spPr>
         <p:txBody>
           <a:bodyPr>
-            <a:normAutofit fontScale="85000" lnSpcReduction="10000"/>
+            <a:normAutofit fontScale="70000" lnSpcReduction="20000"/>
           </a:bodyPr>
           <a:lstStyle/>
           <a:p>
@@ -3644,6 +3649,13 @@
                 <a:hlinkClick r:id="rId3"/>
               </a:rPr>
               <a:t>https://github.com/rudi77/ai_solution_architecture</a:t>
+            </a:r>
+            <a:endParaRPr lang="en-US" dirty="0"/>
+          </a:p>
+          <a:p>
+            <a:r>
+              <a:rPr lang="en-US"/>
+              <a:t>report: </a:t>
             </a:r>
             <a:endParaRPr lang="en-US" dirty="0"/>
           </a:p>
@@ -4166,6 +4178,70 @@
                       </p:childTnLst>
                     </p:cTn>
                   </p:par>
+                  <p:par>
+                    <p:cTn id="31" fill="hold">
+                      <p:stCondLst>
+                        <p:cond delay="indefinite"/>
+                      </p:stCondLst>
+                      <p:childTnLst>
+                        <p:par>
+                          <p:cTn id="32" fill="hold">
+                            <p:stCondLst>
+                              <p:cond delay="0"/>
+                            </p:stCondLst>
+                            <p:childTnLst>
+                              <p:par>
+                                <p:cTn id="33" presetID="10" presetClass="entr" presetSubtype="0" fill="hold" grpId="0" nodeType="clickEffect">
+                                  <p:stCondLst>
+                                    <p:cond delay="1500"/>
+                                  </p:stCondLst>
+                                  <p:iterate>
+                                    <p:tmPct val="10000"/>
+                                  </p:iterate>
+                                  <p:childTnLst>
+                                    <p:set>
+                                      <p:cBhvr>
+                                        <p:cTn id="34" dur="1" fill="hold">
+                                          <p:stCondLst>
+                                            <p:cond delay="0"/>
+                                          </p:stCondLst>
+                                        </p:cTn>
+                                        <p:tgtEl>
+                                          <p:spTgt spid="3">
+                                            <p:txEl>
+                                              <p:pRg st="5" end="5"/>
+                                            </p:txEl>
+                                          </p:spTgt>
+                                        </p:tgtEl>
+                                        <p:attrNameLst>
+                                          <p:attrName>style.visibility</p:attrName>
+                                        </p:attrNameLst>
+                                      </p:cBhvr>
+                                      <p:to>
+                                        <p:strVal val="visible"/>
+                                      </p:to>
+                                    </p:set>
+                                    <p:animEffect transition="in" filter="fade">
+                                      <p:cBhvr>
+                                        <p:cTn id="35" dur="700"/>
+                                        <p:tgtEl>
+                                          <p:spTgt spid="3">
+                                            <p:txEl>
+                                              <p:pRg st="5" end="5"/>
+                                            </p:txEl>
+                                          </p:spTgt>
+                                        </p:tgtEl>
+                                      </p:cBhvr>
+                                    </p:animEffect>
+                                  </p:childTnLst>
+                                </p:cTn>
+                              </p:par>
+                            </p:childTnLst>
+                          </p:cTn>
+                        </p:par>
+                      </p:childTnLst>
+                    </p:cTn>
+                  </p:par>
                 </p:childTnLst>
               </p:cTn>
               <p:prevCondLst>

</xml_diff>